<commit_message>
fix issue #20, #12
</commit_message>
<xml_diff>
--- a/docs/SRS/SystemContextFigure.pptx
+++ b/docs/SRS/SystemContextFigure.pptx
@@ -304,7 +304,7 @@
           <a:p>
             <a:fld id="{779256A2-DE0C-7447-B687-786F38514E8C}" type="datetimeFigureOut">
               <a:rPr lang="en-US" smtClean="0"/>
-              <a:t>2/9/24</a:t>
+              <a:t>2/23/24</a:t>
             </a:fld>
             <a:endParaRPr lang="en-US"/>
           </a:p>
@@ -474,7 +474,7 @@
           <a:p>
             <a:fld id="{779256A2-DE0C-7447-B687-786F38514E8C}" type="datetimeFigureOut">
               <a:rPr lang="en-US" smtClean="0"/>
-              <a:t>2/9/24</a:t>
+              <a:t>2/23/24</a:t>
             </a:fld>
             <a:endParaRPr lang="en-US"/>
           </a:p>
@@ -654,7 +654,7 @@
           <a:p>
             <a:fld id="{779256A2-DE0C-7447-B687-786F38514E8C}" type="datetimeFigureOut">
               <a:rPr lang="en-US" smtClean="0"/>
-              <a:t>2/9/24</a:t>
+              <a:t>2/23/24</a:t>
             </a:fld>
             <a:endParaRPr lang="en-US"/>
           </a:p>
@@ -824,7 +824,7 @@
           <a:p>
             <a:fld id="{779256A2-DE0C-7447-B687-786F38514E8C}" type="datetimeFigureOut">
               <a:rPr lang="en-US" smtClean="0"/>
-              <a:t>2/9/24</a:t>
+              <a:t>2/23/24</a:t>
             </a:fld>
             <a:endParaRPr lang="en-US"/>
           </a:p>
@@ -1070,7 +1070,7 @@
           <a:p>
             <a:fld id="{779256A2-DE0C-7447-B687-786F38514E8C}" type="datetimeFigureOut">
               <a:rPr lang="en-US" smtClean="0"/>
-              <a:t>2/9/24</a:t>
+              <a:t>2/23/24</a:t>
             </a:fld>
             <a:endParaRPr lang="en-US"/>
           </a:p>
@@ -1358,7 +1358,7 @@
           <a:p>
             <a:fld id="{779256A2-DE0C-7447-B687-786F38514E8C}" type="datetimeFigureOut">
               <a:rPr lang="en-US" smtClean="0"/>
-              <a:t>2/9/24</a:t>
+              <a:t>2/23/24</a:t>
             </a:fld>
             <a:endParaRPr lang="en-US"/>
           </a:p>
@@ -1780,7 +1780,7 @@
           <a:p>
             <a:fld id="{779256A2-DE0C-7447-B687-786F38514E8C}" type="datetimeFigureOut">
               <a:rPr lang="en-US" smtClean="0"/>
-              <a:t>2/9/24</a:t>
+              <a:t>2/23/24</a:t>
             </a:fld>
             <a:endParaRPr lang="en-US"/>
           </a:p>
@@ -1898,7 +1898,7 @@
           <a:p>
             <a:fld id="{779256A2-DE0C-7447-B687-786F38514E8C}" type="datetimeFigureOut">
               <a:rPr lang="en-US" smtClean="0"/>
-              <a:t>2/9/24</a:t>
+              <a:t>2/23/24</a:t>
             </a:fld>
             <a:endParaRPr lang="en-US"/>
           </a:p>
@@ -1993,7 +1993,7 @@
           <a:p>
             <a:fld id="{779256A2-DE0C-7447-B687-786F38514E8C}" type="datetimeFigureOut">
               <a:rPr lang="en-US" smtClean="0"/>
-              <a:t>2/9/24</a:t>
+              <a:t>2/23/24</a:t>
             </a:fld>
             <a:endParaRPr lang="en-US"/>
           </a:p>
@@ -2270,7 +2270,7 @@
           <a:p>
             <a:fld id="{779256A2-DE0C-7447-B687-786F38514E8C}" type="datetimeFigureOut">
               <a:rPr lang="en-US" smtClean="0"/>
-              <a:t>2/9/24</a:t>
+              <a:t>2/23/24</a:t>
             </a:fld>
             <a:endParaRPr lang="en-US"/>
           </a:p>
@@ -2523,7 +2523,7 @@
           <a:p>
             <a:fld id="{779256A2-DE0C-7447-B687-786F38514E8C}" type="datetimeFigureOut">
               <a:rPr lang="en-US" smtClean="0"/>
-              <a:t>2/9/24</a:t>
+              <a:t>2/23/24</a:t>
             </a:fld>
             <a:endParaRPr lang="en-US"/>
           </a:p>
@@ -2736,7 +2736,7 @@
           <a:p>
             <a:fld id="{779256A2-DE0C-7447-B687-786F38514E8C}" type="datetimeFigureOut">
               <a:rPr lang="en-US" smtClean="0"/>
-              <a:t>2/9/24</a:t>
+              <a:t>2/23/24</a:t>
             </a:fld>
             <a:endParaRPr lang="en-US"/>
           </a:p>
@@ -3113,202 +3113,187 @@
       </p:grpSpPr>
       <p:grpSp>
         <p:nvGrpSpPr>
-          <p:cNvPr id="10" name="Group 9"/>
+          <p:cNvPr id="6" name="Group 5"/>
           <p:cNvGrpSpPr/>
           <p:nvPr/>
         </p:nvGrpSpPr>
         <p:grpSpPr>
           <a:xfrm>
-            <a:off x="138294" y="2990081"/>
-            <a:ext cx="8861195" cy="918997"/>
-            <a:chOff x="124007" y="1864889"/>
-            <a:chExt cx="8861195" cy="918997"/>
+            <a:off x="269607" y="2447220"/>
+            <a:ext cx="902160" cy="902209"/>
+            <a:chOff x="1370309" y="1881677"/>
+            <a:chExt cx="902160" cy="902209"/>
           </a:xfrm>
         </p:grpSpPr>
-        <p:grpSp>
-          <p:nvGrpSpPr>
-            <p:cNvPr id="6" name="Group 5"/>
-            <p:cNvGrpSpPr/>
+        <p:sp>
+          <p:nvSpPr>
+            <p:cNvPr id="4" name="Oval 3"/>
+            <p:cNvSpPr/>
             <p:nvPr/>
-          </p:nvGrpSpPr>
-          <p:grpSpPr>
+          </p:nvSpPr>
+          <p:spPr>
             <a:xfrm>
-              <a:off x="124007" y="1881677"/>
+              <a:off x="1370309" y="1881677"/>
               <a:ext cx="902160" cy="902209"/>
-              <a:chOff x="1370309" y="1881677"/>
-              <a:chExt cx="902160" cy="902209"/>
             </a:xfrm>
-          </p:grpSpPr>
-          <p:sp>
-            <p:nvSpPr>
-              <p:cNvPr id="4" name="Oval 3"/>
-              <p:cNvSpPr/>
-              <p:nvPr/>
-            </p:nvSpPr>
-            <p:spPr>
-              <a:xfrm>
-                <a:off x="1370309" y="1881677"/>
-                <a:ext cx="902160" cy="902209"/>
-              </a:xfrm>
-              <a:prstGeom prst="ellipse">
-                <a:avLst/>
-              </a:prstGeom>
-              <a:noFill/>
-              <a:ln w="38100" cmpd="sng">
-                <a:solidFill>
-                  <a:schemeClr val="tx1"/>
-                </a:solidFill>
-              </a:ln>
-              <a:effectLst/>
-            </p:spPr>
-            <p:style>
-              <a:lnRef idx="1">
-                <a:schemeClr val="accent1"/>
-              </a:lnRef>
-              <a:fillRef idx="3">
-                <a:schemeClr val="accent1"/>
-              </a:fillRef>
-              <a:effectRef idx="2">
-                <a:schemeClr val="accent1"/>
-              </a:effectRef>
-              <a:fontRef idx="minor">
-                <a:schemeClr val="lt1"/>
-              </a:fontRef>
-            </p:style>
-            <p:txBody>
-              <a:bodyPr rtlCol="0" anchor="ctr"/>
-              <a:lstStyle/>
-              <a:p>
-                <a:pPr algn="ctr"/>
-                <a:endParaRPr lang="en-US"/>
-              </a:p>
-            </p:txBody>
-          </p:sp>
-          <p:sp>
-            <p:nvSpPr>
-              <p:cNvPr id="5" name="TextBox 4"/>
-              <p:cNvSpPr txBox="1"/>
-              <p:nvPr/>
-            </p:nvSpPr>
-            <p:spPr>
-              <a:xfrm>
-                <a:off x="1446726" y="2101948"/>
-                <a:ext cx="762949" cy="461665"/>
-              </a:xfrm>
-              <a:prstGeom prst="rect">
-                <a:avLst/>
-              </a:prstGeom>
-              <a:noFill/>
-            </p:spPr>
-            <p:txBody>
-              <a:bodyPr wrap="none" rtlCol="0">
-                <a:spAutoFit/>
-              </a:bodyPr>
-              <a:lstStyle/>
-              <a:p>
-                <a:r>
-                  <a:rPr lang="en-US" sz="2400" dirty="0">
-                    <a:latin typeface="Times New Roman"/>
-                    <a:cs typeface="Times New Roman"/>
-                  </a:rPr>
-                  <a:t>User</a:t>
-                </a:r>
-              </a:p>
-            </p:txBody>
-          </p:sp>
-        </p:grpSp>
-        <p:grpSp>
-          <p:nvGrpSpPr>
-            <p:cNvPr id="7" name="Group 6"/>
-            <p:cNvGrpSpPr/>
+            <a:prstGeom prst="ellipse">
+              <a:avLst/>
+            </a:prstGeom>
+            <a:noFill/>
+            <a:ln w="38100" cmpd="sng">
+              <a:solidFill>
+                <a:schemeClr val="tx1"/>
+              </a:solidFill>
+            </a:ln>
+            <a:effectLst/>
+          </p:spPr>
+          <p:style>
+            <a:lnRef idx="1">
+              <a:schemeClr val="accent1"/>
+            </a:lnRef>
+            <a:fillRef idx="3">
+              <a:schemeClr val="accent1"/>
+            </a:fillRef>
+            <a:effectRef idx="2">
+              <a:schemeClr val="accent1"/>
+            </a:effectRef>
+            <a:fontRef idx="minor">
+              <a:schemeClr val="lt1"/>
+            </a:fontRef>
+          </p:style>
+          <p:txBody>
+            <a:bodyPr rtlCol="0" anchor="ctr"/>
+            <a:lstStyle/>
+            <a:p>
+              <a:pPr algn="ctr"/>
+              <a:endParaRPr lang="en-US"/>
+            </a:p>
+          </p:txBody>
+        </p:sp>
+        <p:sp>
+          <p:nvSpPr>
+            <p:cNvPr id="5" name="TextBox 4"/>
+            <p:cNvSpPr txBox="1"/>
             <p:nvPr/>
-          </p:nvGrpSpPr>
-          <p:grpSpPr>
+          </p:nvSpPr>
+          <p:spPr>
             <a:xfrm>
-              <a:off x="8142812" y="1864889"/>
+              <a:off x="1446726" y="2101948"/>
+              <a:ext cx="762949" cy="461665"/>
+            </a:xfrm>
+            <a:prstGeom prst="rect">
+              <a:avLst/>
+            </a:prstGeom>
+            <a:noFill/>
+          </p:spPr>
+          <p:txBody>
+            <a:bodyPr wrap="none" rtlCol="0">
+              <a:spAutoFit/>
+            </a:bodyPr>
+            <a:lstStyle/>
+            <a:p>
+              <a:r>
+                <a:rPr lang="en-US" sz="2400" dirty="0">
+                  <a:latin typeface="Times New Roman"/>
+                  <a:cs typeface="Times New Roman"/>
+                </a:rPr>
+                <a:t>User</a:t>
+              </a:r>
+            </a:p>
+          </p:txBody>
+        </p:sp>
+      </p:grpSp>
+      <p:grpSp>
+        <p:nvGrpSpPr>
+          <p:cNvPr id="7" name="Group 6"/>
+          <p:cNvGrpSpPr/>
+          <p:nvPr/>
+        </p:nvGrpSpPr>
+        <p:grpSpPr>
+          <a:xfrm>
+            <a:off x="8179707" y="3039626"/>
+            <a:ext cx="842390" cy="842436"/>
+            <a:chOff x="1776705" y="1864889"/>
+            <a:chExt cx="842390" cy="842436"/>
+          </a:xfrm>
+        </p:grpSpPr>
+        <p:sp>
+          <p:nvSpPr>
+            <p:cNvPr id="8" name="Oval 7"/>
+            <p:cNvSpPr/>
+            <p:nvPr/>
+          </p:nvSpPr>
+          <p:spPr>
+            <a:xfrm>
+              <a:off x="1776705" y="1864889"/>
               <a:ext cx="842390" cy="842436"/>
-              <a:chOff x="1776705" y="1864889"/>
-              <a:chExt cx="842390" cy="842436"/>
             </a:xfrm>
-          </p:grpSpPr>
-          <p:sp>
-            <p:nvSpPr>
-              <p:cNvPr id="8" name="Oval 7"/>
-              <p:cNvSpPr/>
-              <p:nvPr/>
-            </p:nvSpPr>
-            <p:spPr>
-              <a:xfrm>
-                <a:off x="1776705" y="1864889"/>
-                <a:ext cx="842390" cy="842436"/>
-              </a:xfrm>
-              <a:prstGeom prst="ellipse">
-                <a:avLst/>
-              </a:prstGeom>
-              <a:noFill/>
-              <a:ln w="38100" cmpd="sng">
-                <a:solidFill>
-                  <a:schemeClr val="tx1"/>
-                </a:solidFill>
-              </a:ln>
-              <a:effectLst/>
-            </p:spPr>
-            <p:style>
-              <a:lnRef idx="1">
-                <a:schemeClr val="accent1"/>
-              </a:lnRef>
-              <a:fillRef idx="3">
-                <a:schemeClr val="accent1"/>
-              </a:fillRef>
-              <a:effectRef idx="2">
-                <a:schemeClr val="accent1"/>
-              </a:effectRef>
-              <a:fontRef idx="minor">
-                <a:schemeClr val="lt1"/>
-              </a:fontRef>
-            </p:style>
-            <p:txBody>
-              <a:bodyPr rtlCol="0" anchor="ctr"/>
-              <a:lstStyle/>
-              <a:p>
-                <a:pPr algn="ctr"/>
-                <a:endParaRPr lang="en-US"/>
-              </a:p>
-            </p:txBody>
-          </p:sp>
-          <p:sp>
-            <p:nvSpPr>
-              <p:cNvPr id="9" name="TextBox 8"/>
-              <p:cNvSpPr txBox="1"/>
-              <p:nvPr/>
-            </p:nvSpPr>
-            <p:spPr>
-              <a:xfrm>
-                <a:off x="1816482" y="2023609"/>
-                <a:ext cx="762949" cy="461665"/>
-              </a:xfrm>
-              <a:prstGeom prst="rect">
-                <a:avLst/>
-              </a:prstGeom>
-              <a:noFill/>
-            </p:spPr>
-            <p:txBody>
-              <a:bodyPr wrap="none" rtlCol="0">
-                <a:spAutoFit/>
-              </a:bodyPr>
-              <a:lstStyle/>
-              <a:p>
-                <a:r>
-                  <a:rPr lang="en-US" sz="2400" dirty="0">
-                    <a:latin typeface="Times New Roman"/>
-                    <a:cs typeface="Times New Roman"/>
-                  </a:rPr>
-                  <a:t>User</a:t>
-                </a:r>
-              </a:p>
-            </p:txBody>
-          </p:sp>
-        </p:grpSp>
+            <a:prstGeom prst="ellipse">
+              <a:avLst/>
+            </a:prstGeom>
+            <a:noFill/>
+            <a:ln w="38100" cmpd="sng">
+              <a:solidFill>
+                <a:schemeClr val="tx1"/>
+              </a:solidFill>
+            </a:ln>
+            <a:effectLst/>
+          </p:spPr>
+          <p:style>
+            <a:lnRef idx="1">
+              <a:schemeClr val="accent1"/>
+            </a:lnRef>
+            <a:fillRef idx="3">
+              <a:schemeClr val="accent1"/>
+            </a:fillRef>
+            <a:effectRef idx="2">
+              <a:schemeClr val="accent1"/>
+            </a:effectRef>
+            <a:fontRef idx="minor">
+              <a:schemeClr val="lt1"/>
+            </a:fontRef>
+          </p:style>
+          <p:txBody>
+            <a:bodyPr rtlCol="0" anchor="ctr"/>
+            <a:lstStyle/>
+            <a:p>
+              <a:pPr algn="ctr"/>
+              <a:endParaRPr lang="en-US"/>
+            </a:p>
+          </p:txBody>
+        </p:sp>
+        <p:sp>
+          <p:nvSpPr>
+            <p:cNvPr id="9" name="TextBox 8"/>
+            <p:cNvSpPr txBox="1"/>
+            <p:nvPr/>
+          </p:nvSpPr>
+          <p:spPr>
+            <a:xfrm>
+              <a:off x="1816482" y="2023609"/>
+              <a:ext cx="762949" cy="461665"/>
+            </a:xfrm>
+            <a:prstGeom prst="rect">
+              <a:avLst/>
+            </a:prstGeom>
+            <a:noFill/>
+          </p:spPr>
+          <p:txBody>
+            <a:bodyPr wrap="none" rtlCol="0">
+              <a:spAutoFit/>
+            </a:bodyPr>
+            <a:lstStyle/>
+            <a:p>
+              <a:r>
+                <a:rPr lang="en-US" sz="2400" dirty="0">
+                  <a:latin typeface="Times New Roman"/>
+                  <a:cs typeface="Times New Roman"/>
+                </a:rPr>
+                <a:t>User</a:t>
+              </a:r>
+            </a:p>
+          </p:txBody>
+        </p:sp>
       </p:grpSp>
       <p:grpSp>
         <p:nvGrpSpPr>
@@ -3431,8 +3416,8 @@
         </p:nvCxnSpPr>
         <p:spPr>
           <a:xfrm>
-            <a:off x="1040454" y="3457974"/>
-            <a:ext cx="3104927" cy="9441"/>
+            <a:off x="1171767" y="2898325"/>
+            <a:ext cx="2973615" cy="569090"/>
           </a:xfrm>
           <a:prstGeom prst="straightConnector1">
             <a:avLst/>
@@ -3505,7 +3490,7 @@
         </p:nvSpPr>
         <p:spPr>
           <a:xfrm>
-            <a:off x="1249071" y="3070271"/>
+            <a:off x="1313010" y="2635108"/>
             <a:ext cx="2832372" cy="369332"/>
           </a:xfrm>
           <a:prstGeom prst="rect">
@@ -3531,14 +3516,7 @@
                 <a:latin typeface="Times New Roman"/>
                 <a:cs typeface="Times New Roman"/>
               </a:rPr>
-              <a:t>: </a:t>
-            </a:r>
-            <a:r>
-              <a:rPr lang="en-US" smtClean="0">
-                <a:latin typeface="Times New Roman"/>
-                <a:cs typeface="Times New Roman"/>
-              </a:rPr>
-              <a:t>Coordinates</a:t>
+              <a:t>: Coordinates</a:t>
             </a:r>
             <a:endParaRPr lang="en-US" dirty="0">
               <a:latin typeface="Times New Roman"/>
@@ -3609,8 +3587,8 @@
         </p:nvSpPr>
         <p:spPr>
           <a:xfrm>
-            <a:off x="959140" y="3449825"/>
-            <a:ext cx="3249312" cy="1200329"/>
+            <a:off x="1771896" y="4040046"/>
+            <a:ext cx="2450598" cy="1200329"/>
           </a:xfrm>
           <a:prstGeom prst="rect">
             <a:avLst/>
@@ -3624,39 +3602,25 @@
           <a:lstStyle/>
           <a:p>
             <a:r>
+              <a:rPr lang="en-US" smtClean="0">
+                <a:latin typeface="Times New Roman"/>
+                <a:cs typeface="Times New Roman"/>
+              </a:rPr>
+              <a:t>Developers Inputs: </a:t>
+            </a:r>
+            <a:endParaRPr lang="en-US" dirty="0">
+              <a:latin typeface="Times New Roman"/>
+              <a:cs typeface="Times New Roman"/>
+            </a:endParaRPr>
+          </a:p>
+          <a:p>
+            <a:pPr algn="r"/>
+            <a:r>
               <a:rPr lang="en-US" dirty="0" smtClean="0">
                 <a:latin typeface="Times New Roman"/>
                 <a:cs typeface="Times New Roman"/>
               </a:rPr>
-              <a:t>Dataset </a:t>
-            </a:r>
-            <a:r>
-              <a:rPr lang="en-US" dirty="0" smtClean="0">
-                <a:latin typeface="Times New Roman"/>
-                <a:cs typeface="Times New Roman"/>
-              </a:rPr>
-              <a:t>Inputs(by developers): </a:t>
-            </a:r>
-            <a:endParaRPr lang="en-US" dirty="0">
-              <a:latin typeface="Times New Roman"/>
-              <a:cs typeface="Times New Roman"/>
-            </a:endParaRPr>
-          </a:p>
-          <a:p>
-            <a:pPr algn="r"/>
-            <a:r>
-              <a:rPr lang="en-US" dirty="0" smtClean="0">
-                <a:latin typeface="Times New Roman"/>
-                <a:cs typeface="Times New Roman"/>
-              </a:rPr>
-              <a:t> Salt </a:t>
-            </a:r>
-            <a:r>
-              <a:rPr lang="en-US" dirty="0" smtClean="0">
-                <a:latin typeface="Times New Roman"/>
-                <a:cs typeface="Times New Roman"/>
-              </a:rPr>
-              <a:t>application rate </a:t>
+              <a:t> Salt application rate </a:t>
             </a:r>
           </a:p>
           <a:p>
@@ -3685,6 +3649,124 @@
           </a:p>
         </p:txBody>
       </p:sp>
+      <p:sp>
+        <p:nvSpPr>
+          <p:cNvPr id="21" name="Oval 20"/>
+          <p:cNvSpPr/>
+          <p:nvPr/>
+        </p:nvSpPr>
+        <p:spPr>
+          <a:xfrm>
+            <a:off x="231676" y="3660011"/>
+            <a:ext cx="1540220" cy="842436"/>
+          </a:xfrm>
+          <a:prstGeom prst="ellipse">
+            <a:avLst/>
+          </a:prstGeom>
+          <a:noFill/>
+          <a:ln w="38100" cmpd="sng">
+            <a:solidFill>
+              <a:schemeClr val="tx1"/>
+            </a:solidFill>
+          </a:ln>
+          <a:effectLst/>
+        </p:spPr>
+        <p:style>
+          <a:lnRef idx="1">
+            <a:schemeClr val="accent1"/>
+          </a:lnRef>
+          <a:fillRef idx="3">
+            <a:schemeClr val="accent1"/>
+          </a:fillRef>
+          <a:effectRef idx="2">
+            <a:schemeClr val="accent1"/>
+          </a:effectRef>
+          <a:fontRef idx="minor">
+            <a:schemeClr val="lt1"/>
+          </a:fontRef>
+        </p:style>
+        <p:txBody>
+          <a:bodyPr rtlCol="0" anchor="ctr"/>
+          <a:lstStyle/>
+          <a:p>
+            <a:pPr algn="ctr"/>
+            <a:endParaRPr lang="en-US"/>
+          </a:p>
+        </p:txBody>
+      </p:sp>
+      <p:sp>
+        <p:nvSpPr>
+          <p:cNvPr id="22" name="TextBox 21"/>
+          <p:cNvSpPr txBox="1"/>
+          <p:nvPr/>
+        </p:nvSpPr>
+        <p:spPr>
+          <a:xfrm>
+            <a:off x="255565" y="3809390"/>
+            <a:ext cx="1585690" cy="461665"/>
+          </a:xfrm>
+          <a:prstGeom prst="rect">
+            <a:avLst/>
+          </a:prstGeom>
+          <a:noFill/>
+        </p:spPr>
+        <p:txBody>
+          <a:bodyPr wrap="none" rtlCol="0">
+            <a:spAutoFit/>
+          </a:bodyPr>
+          <a:lstStyle/>
+          <a:p>
+            <a:r>
+              <a:rPr lang="en-US" sz="2400" smtClean="0">
+                <a:latin typeface="Times New Roman"/>
+                <a:cs typeface="Times New Roman"/>
+              </a:rPr>
+              <a:t>Developers</a:t>
+            </a:r>
+            <a:endParaRPr lang="en-US" sz="2400" dirty="0">
+              <a:latin typeface="Times New Roman"/>
+              <a:cs typeface="Times New Roman"/>
+            </a:endParaRPr>
+          </a:p>
+        </p:txBody>
+      </p:sp>
+      <p:cxnSp>
+        <p:nvCxnSpPr>
+          <p:cNvPr id="24" name="Straight Arrow Connector 23"/>
+          <p:cNvCxnSpPr/>
+          <p:nvPr/>
+        </p:nvCxnSpPr>
+        <p:spPr>
+          <a:xfrm flipV="1">
+            <a:off x="1771896" y="3772827"/>
+            <a:ext cx="2373486" cy="317773"/>
+          </a:xfrm>
+          <a:prstGeom prst="straightConnector1">
+            <a:avLst/>
+          </a:prstGeom>
+          <a:ln w="38100" cmpd="sng">
+            <a:solidFill>
+              <a:schemeClr val="tx1"/>
+            </a:solidFill>
+            <a:tailEnd type="arrow"/>
+          </a:ln>
+          <a:effectLst/>
+        </p:spPr>
+        <p:style>
+          <a:lnRef idx="2">
+            <a:schemeClr val="accent1"/>
+          </a:lnRef>
+          <a:fillRef idx="0">
+            <a:schemeClr val="accent1"/>
+          </a:fillRef>
+          <a:effectRef idx="1">
+            <a:schemeClr val="accent1"/>
+          </a:effectRef>
+          <a:fontRef idx="minor">
+            <a:schemeClr val="tx1"/>
+          </a:fontRef>
+        </p:style>
+      </p:cxnSp>
     </p:spTree>
     <p:extLst>
       <p:ext uri="{BB962C8B-B14F-4D97-AF65-F5344CB8AC3E}">

</xml_diff>

<commit_message>
update stakeholder section according to meeting
</commit_message>
<xml_diff>
--- a/docs/SRS/SystemContextFigure.pptx
+++ b/docs/SRS/SystemContextFigure.pptx
@@ -304,7 +304,7 @@
           <a:p>
             <a:fld id="{779256A2-DE0C-7447-B687-786F38514E8C}" type="datetimeFigureOut">
               <a:rPr lang="en-US" smtClean="0"/>
-              <a:t>7/10/24</a:t>
+              <a:t>7/11/24</a:t>
             </a:fld>
             <a:endParaRPr lang="en-US"/>
           </a:p>
@@ -474,7 +474,7 @@
           <a:p>
             <a:fld id="{779256A2-DE0C-7447-B687-786F38514E8C}" type="datetimeFigureOut">
               <a:rPr lang="en-US" smtClean="0"/>
-              <a:t>7/10/24</a:t>
+              <a:t>7/11/24</a:t>
             </a:fld>
             <a:endParaRPr lang="en-US"/>
           </a:p>
@@ -654,7 +654,7 @@
           <a:p>
             <a:fld id="{779256A2-DE0C-7447-B687-786F38514E8C}" type="datetimeFigureOut">
               <a:rPr lang="en-US" smtClean="0"/>
-              <a:t>7/10/24</a:t>
+              <a:t>7/11/24</a:t>
             </a:fld>
             <a:endParaRPr lang="en-US"/>
           </a:p>
@@ -824,7 +824,7 @@
           <a:p>
             <a:fld id="{779256A2-DE0C-7447-B687-786F38514E8C}" type="datetimeFigureOut">
               <a:rPr lang="en-US" smtClean="0"/>
-              <a:t>7/10/24</a:t>
+              <a:t>7/11/24</a:t>
             </a:fld>
             <a:endParaRPr lang="en-US"/>
           </a:p>
@@ -1070,7 +1070,7 @@
           <a:p>
             <a:fld id="{779256A2-DE0C-7447-B687-786F38514E8C}" type="datetimeFigureOut">
               <a:rPr lang="en-US" smtClean="0"/>
-              <a:t>7/10/24</a:t>
+              <a:t>7/11/24</a:t>
             </a:fld>
             <a:endParaRPr lang="en-US"/>
           </a:p>
@@ -1358,7 +1358,7 @@
           <a:p>
             <a:fld id="{779256A2-DE0C-7447-B687-786F38514E8C}" type="datetimeFigureOut">
               <a:rPr lang="en-US" smtClean="0"/>
-              <a:t>7/10/24</a:t>
+              <a:t>7/11/24</a:t>
             </a:fld>
             <a:endParaRPr lang="en-US"/>
           </a:p>
@@ -1780,7 +1780,7 @@
           <a:p>
             <a:fld id="{779256A2-DE0C-7447-B687-786F38514E8C}" type="datetimeFigureOut">
               <a:rPr lang="en-US" smtClean="0"/>
-              <a:t>7/10/24</a:t>
+              <a:t>7/11/24</a:t>
             </a:fld>
             <a:endParaRPr lang="en-US"/>
           </a:p>
@@ -1898,7 +1898,7 @@
           <a:p>
             <a:fld id="{779256A2-DE0C-7447-B687-786F38514E8C}" type="datetimeFigureOut">
               <a:rPr lang="en-US" smtClean="0"/>
-              <a:t>7/10/24</a:t>
+              <a:t>7/11/24</a:t>
             </a:fld>
             <a:endParaRPr lang="en-US"/>
           </a:p>
@@ -1993,7 +1993,7 @@
           <a:p>
             <a:fld id="{779256A2-DE0C-7447-B687-786F38514E8C}" type="datetimeFigureOut">
               <a:rPr lang="en-US" smtClean="0"/>
-              <a:t>7/10/24</a:t>
+              <a:t>7/11/24</a:t>
             </a:fld>
             <a:endParaRPr lang="en-US"/>
           </a:p>
@@ -2270,7 +2270,7 @@
           <a:p>
             <a:fld id="{779256A2-DE0C-7447-B687-786F38514E8C}" type="datetimeFigureOut">
               <a:rPr lang="en-US" smtClean="0"/>
-              <a:t>7/10/24</a:t>
+              <a:t>7/11/24</a:t>
             </a:fld>
             <a:endParaRPr lang="en-US"/>
           </a:p>
@@ -2523,7 +2523,7 @@
           <a:p>
             <a:fld id="{779256A2-DE0C-7447-B687-786F38514E8C}" type="datetimeFigureOut">
               <a:rPr lang="en-US" smtClean="0"/>
-              <a:t>7/10/24</a:t>
+              <a:t>7/11/24</a:t>
             </a:fld>
             <a:endParaRPr lang="en-US"/>
           </a:p>
@@ -2736,7 +2736,7 @@
           <a:p>
             <a:fld id="{779256A2-DE0C-7447-B687-786F38514E8C}" type="datetimeFigureOut">
               <a:rPr lang="en-US" smtClean="0"/>
-              <a:t>7/10/24</a:t>
+              <a:t>7/11/24</a:t>
             </a:fld>
             <a:endParaRPr lang="en-US"/>
           </a:p>
@@ -3410,14 +3410,13 @@
           <p:cNvPr id="25" name="Straight Arrow Connector 24"/>
           <p:cNvCxnSpPr>
             <a:stCxn id="4" idx="6"/>
-            <a:endCxn id="18" idx="1"/>
           </p:cNvCxnSpPr>
           <p:nvPr/>
         </p:nvCxnSpPr>
         <p:spPr>
           <a:xfrm>
             <a:off x="1171767" y="2898325"/>
-            <a:ext cx="2973615" cy="569090"/>
+            <a:ext cx="3011063" cy="397024"/>
           </a:xfrm>
           <a:prstGeom prst="straightConnector1">
             <a:avLst/>
@@ -3490,8 +3489,8 @@
         </p:nvSpPr>
         <p:spPr>
           <a:xfrm>
-            <a:off x="1313010" y="2635108"/>
-            <a:ext cx="2832372" cy="369332"/>
+            <a:off x="809939" y="2275016"/>
+            <a:ext cx="3380274" cy="923330"/>
           </a:xfrm>
           <a:prstGeom prst="rect">
             <a:avLst/>
@@ -3504,19 +3503,47 @@
           </a:bodyPr>
           <a:lstStyle/>
           <a:p>
+            <a:pPr algn="r"/>
             <a:r>
               <a:rPr lang="en-US" dirty="0" smtClean="0">
                 <a:latin typeface="Times New Roman"/>
                 <a:cs typeface="Times New Roman"/>
               </a:rPr>
-              <a:t>User Inputs</a:t>
-            </a:r>
-            <a:r>
-              <a:rPr lang="en-US" smtClean="0">
+              <a:t>User Inputs: </a:t>
+            </a:r>
+            <a:r>
+              <a:rPr lang="en-US" dirty="0" smtClean="0">
                 <a:latin typeface="Times New Roman"/>
                 <a:cs typeface="Times New Roman"/>
               </a:rPr>
-              <a:t>: Coordinates</a:t>
+              <a:t>Salt application rate</a:t>
+            </a:r>
+          </a:p>
+          <a:p>
+            <a:pPr algn="r"/>
+            <a:r>
+              <a:rPr lang="en-US" dirty="0" smtClean="0">
+                <a:latin typeface="Times New Roman"/>
+                <a:cs typeface="Times New Roman"/>
+              </a:rPr>
+              <a:t>Bridge component</a:t>
+            </a:r>
+          </a:p>
+          <a:p>
+            <a:pPr algn="r"/>
+            <a:r>
+              <a:rPr lang="en-US" dirty="0">
+                <a:latin typeface="Times New Roman"/>
+                <a:cs typeface="Times New Roman"/>
+              </a:rPr>
+              <a:t>Bridge </a:t>
+            </a:r>
+            <a:r>
+              <a:rPr lang="en-US" dirty="0" smtClean="0">
+                <a:latin typeface="Times New Roman"/>
+                <a:cs typeface="Times New Roman"/>
+              </a:rPr>
+              <a:t>site</a:t>
             </a:r>
             <a:endParaRPr lang="en-US" dirty="0">
               <a:latin typeface="Times New Roman"/>
@@ -3620,35 +3647,17 @@
                 <a:latin typeface="Times New Roman"/>
                 <a:cs typeface="Times New Roman"/>
               </a:rPr>
-              <a:t>Climate </a:t>
-            </a:r>
+              <a:t>Climate table</a:t>
+            </a:r>
+          </a:p>
+          <a:p>
+            <a:pPr algn="r"/>
             <a:r>
               <a:rPr lang="en-US" dirty="0" smtClean="0">
                 <a:latin typeface="Times New Roman"/>
                 <a:cs typeface="Times New Roman"/>
               </a:rPr>
-              <a:t>table</a:t>
-            </a:r>
-            <a:endParaRPr lang="en-US" dirty="0" smtClean="0">
-              <a:latin typeface="Times New Roman"/>
-              <a:cs typeface="Times New Roman"/>
-            </a:endParaRPr>
-          </a:p>
-          <a:p>
-            <a:pPr algn="r"/>
-            <a:r>
-              <a:rPr lang="en-US" dirty="0" smtClean="0">
-                <a:latin typeface="Times New Roman"/>
-                <a:cs typeface="Times New Roman"/>
-              </a:rPr>
-              <a:t>Traffic </a:t>
-            </a:r>
-            <a:r>
-              <a:rPr lang="en-US" dirty="0" smtClean="0">
-                <a:latin typeface="Times New Roman"/>
-                <a:cs typeface="Times New Roman"/>
-              </a:rPr>
-              <a:t>table</a:t>
+              <a:t>Traffic table</a:t>
             </a:r>
             <a:endParaRPr lang="en-US" dirty="0">
               <a:latin typeface="Times New Roman"/>

</xml_diff>

<commit_message>
adjust based on #67, fix error in data table
</commit_message>
<xml_diff>
--- a/docs/SRS/SystemContextFigure.pptx
+++ b/docs/SRS/SystemContextFigure.pptx
@@ -4,6 +4,9 @@
   <p:sldMasterIdLst>
     <p:sldMasterId id="2147483648" r:id="rId1"/>
   </p:sldMasterIdLst>
+  <p:notesMasterIdLst>
+    <p:notesMasterId r:id="rId3"/>
+  </p:notesMasterIdLst>
   <p:sldIdLst>
     <p:sldId id="256" r:id="rId2"/>
   </p:sldIdLst>
@@ -123,6 +126,440 @@
 </p:presentation>
 </file>
 
+<file path=ppt/notesMasters/notesMaster1.xml><?xml version="1.0" encoding="utf-8"?>
+<p:notesMaster xmlns:a="http://schemas.openxmlformats.org/drawingml/2006/main" xmlns:r="http://schemas.openxmlformats.org/officeDocument/2006/relationships" xmlns:p="http://schemas.openxmlformats.org/presentationml/2006/main">
+  <p:cSld>
+    <p:bg>
+      <p:bgRef idx="1001">
+        <a:schemeClr val="bg1"/>
+      </p:bgRef>
+    </p:bg>
+    <p:spTree>
+      <p:nvGrpSpPr>
+        <p:cNvPr id="1" name=""/>
+        <p:cNvGrpSpPr/>
+        <p:nvPr/>
+      </p:nvGrpSpPr>
+      <p:grpSpPr>
+        <a:xfrm>
+          <a:off x="0" y="0"/>
+          <a:ext cx="0" cy="0"/>
+          <a:chOff x="0" y="0"/>
+          <a:chExt cx="0" cy="0"/>
+        </a:xfrm>
+      </p:grpSpPr>
+      <p:sp>
+        <p:nvSpPr>
+          <p:cNvPr id="2" name="Header Placeholder 1"/>
+          <p:cNvSpPr>
+            <a:spLocks noGrp="1"/>
+          </p:cNvSpPr>
+          <p:nvPr>
+            <p:ph type="hdr" sz="quarter"/>
+          </p:nvPr>
+        </p:nvSpPr>
+        <p:spPr>
+          <a:xfrm>
+            <a:off x="0" y="0"/>
+            <a:ext cx="2971800" cy="458788"/>
+          </a:xfrm>
+          <a:prstGeom prst="rect">
+            <a:avLst/>
+          </a:prstGeom>
+        </p:spPr>
+        <p:txBody>
+          <a:bodyPr vert="horz" lIns="91440" tIns="45720" rIns="91440" bIns="45720" rtlCol="0"/>
+          <a:lstStyle>
+            <a:lvl1pPr algn="l">
+              <a:defRPr sz="1200"/>
+            </a:lvl1pPr>
+          </a:lstStyle>
+          <a:p>
+            <a:endParaRPr lang="en-US"/>
+          </a:p>
+        </p:txBody>
+      </p:sp>
+      <p:sp>
+        <p:nvSpPr>
+          <p:cNvPr id="3" name="Date Placeholder 2"/>
+          <p:cNvSpPr>
+            <a:spLocks noGrp="1"/>
+          </p:cNvSpPr>
+          <p:nvPr>
+            <p:ph type="dt" idx="1"/>
+          </p:nvPr>
+        </p:nvSpPr>
+        <p:spPr>
+          <a:xfrm>
+            <a:off x="3884613" y="0"/>
+            <a:ext cx="2971800" cy="458788"/>
+          </a:xfrm>
+          <a:prstGeom prst="rect">
+            <a:avLst/>
+          </a:prstGeom>
+        </p:spPr>
+        <p:txBody>
+          <a:bodyPr vert="horz" lIns="91440" tIns="45720" rIns="91440" bIns="45720" rtlCol="0"/>
+          <a:lstStyle>
+            <a:lvl1pPr algn="r">
+              <a:defRPr sz="1200"/>
+            </a:lvl1pPr>
+          </a:lstStyle>
+          <a:p>
+            <a:fld id="{063B75EE-F1BC-F846-8752-AFE4A605F2E0}" type="datetimeFigureOut">
+              <a:rPr lang="en-US" smtClean="0"/>
+              <a:t>7/25/24</a:t>
+            </a:fld>
+            <a:endParaRPr lang="en-US"/>
+          </a:p>
+        </p:txBody>
+      </p:sp>
+      <p:sp>
+        <p:nvSpPr>
+          <p:cNvPr id="4" name="Slide Image Placeholder 3"/>
+          <p:cNvSpPr>
+            <a:spLocks noGrp="1" noRot="1" noChangeAspect="1"/>
+          </p:cNvSpPr>
+          <p:nvPr>
+            <p:ph type="sldImg" idx="2"/>
+          </p:nvPr>
+        </p:nvSpPr>
+        <p:spPr>
+          <a:xfrm>
+            <a:off x="1371600" y="1143000"/>
+            <a:ext cx="4114800" cy="3086100"/>
+          </a:xfrm>
+          <a:prstGeom prst="rect">
+            <a:avLst/>
+          </a:prstGeom>
+          <a:noFill/>
+          <a:ln w="12700">
+            <a:solidFill>
+              <a:prstClr val="black"/>
+            </a:solidFill>
+          </a:ln>
+        </p:spPr>
+        <p:txBody>
+          <a:bodyPr vert="horz" lIns="91440" tIns="45720" rIns="91440" bIns="45720" rtlCol="0" anchor="ctr"/>
+          <a:lstStyle/>
+          <a:p>
+            <a:endParaRPr lang="en-US"/>
+          </a:p>
+        </p:txBody>
+      </p:sp>
+      <p:sp>
+        <p:nvSpPr>
+          <p:cNvPr id="5" name="Notes Placeholder 4"/>
+          <p:cNvSpPr>
+            <a:spLocks noGrp="1"/>
+          </p:cNvSpPr>
+          <p:nvPr>
+            <p:ph type="body" sz="quarter" idx="3"/>
+          </p:nvPr>
+        </p:nvSpPr>
+        <p:spPr>
+          <a:xfrm>
+            <a:off x="685800" y="4400550"/>
+            <a:ext cx="5486400" cy="3600450"/>
+          </a:xfrm>
+          <a:prstGeom prst="rect">
+            <a:avLst/>
+          </a:prstGeom>
+        </p:spPr>
+        <p:txBody>
+          <a:bodyPr vert="horz" lIns="91440" tIns="45720" rIns="91440" bIns="45720" rtlCol="0"/>
+          <a:lstStyle/>
+          <a:p>
+            <a:pPr lvl="0"/>
+            <a:r>
+              <a:rPr lang="en-US" smtClean="0"/>
+              <a:t>Click to edit Master text styles</a:t>
+            </a:r>
+          </a:p>
+          <a:p>
+            <a:pPr lvl="1"/>
+            <a:r>
+              <a:rPr lang="en-US" smtClean="0"/>
+              <a:t>Second level</a:t>
+            </a:r>
+          </a:p>
+          <a:p>
+            <a:pPr lvl="2"/>
+            <a:r>
+              <a:rPr lang="en-US" smtClean="0"/>
+              <a:t>Third level</a:t>
+            </a:r>
+          </a:p>
+          <a:p>
+            <a:pPr lvl="3"/>
+            <a:r>
+              <a:rPr lang="en-US" smtClean="0"/>
+              <a:t>Fourth level</a:t>
+            </a:r>
+          </a:p>
+          <a:p>
+            <a:pPr lvl="4"/>
+            <a:r>
+              <a:rPr lang="en-US" smtClean="0"/>
+              <a:t>Fifth level</a:t>
+            </a:r>
+            <a:endParaRPr lang="en-US"/>
+          </a:p>
+        </p:txBody>
+      </p:sp>
+      <p:sp>
+        <p:nvSpPr>
+          <p:cNvPr id="6" name="Footer Placeholder 5"/>
+          <p:cNvSpPr>
+            <a:spLocks noGrp="1"/>
+          </p:cNvSpPr>
+          <p:nvPr>
+            <p:ph type="ftr" sz="quarter" idx="4"/>
+          </p:nvPr>
+        </p:nvSpPr>
+        <p:spPr>
+          <a:xfrm>
+            <a:off x="0" y="8685213"/>
+            <a:ext cx="2971800" cy="458787"/>
+          </a:xfrm>
+          <a:prstGeom prst="rect">
+            <a:avLst/>
+          </a:prstGeom>
+        </p:spPr>
+        <p:txBody>
+          <a:bodyPr vert="horz" lIns="91440" tIns="45720" rIns="91440" bIns="45720" rtlCol="0" anchor="b"/>
+          <a:lstStyle>
+            <a:lvl1pPr algn="l">
+              <a:defRPr sz="1200"/>
+            </a:lvl1pPr>
+          </a:lstStyle>
+          <a:p>
+            <a:endParaRPr lang="en-US"/>
+          </a:p>
+        </p:txBody>
+      </p:sp>
+      <p:sp>
+        <p:nvSpPr>
+          <p:cNvPr id="7" name="Slide Number Placeholder 6"/>
+          <p:cNvSpPr>
+            <a:spLocks noGrp="1"/>
+          </p:cNvSpPr>
+          <p:nvPr>
+            <p:ph type="sldNum" sz="quarter" idx="5"/>
+          </p:nvPr>
+        </p:nvSpPr>
+        <p:spPr>
+          <a:xfrm>
+            <a:off x="3884613" y="8685213"/>
+            <a:ext cx="2971800" cy="458787"/>
+          </a:xfrm>
+          <a:prstGeom prst="rect">
+            <a:avLst/>
+          </a:prstGeom>
+        </p:spPr>
+        <p:txBody>
+          <a:bodyPr vert="horz" lIns="91440" tIns="45720" rIns="91440" bIns="45720" rtlCol="0" anchor="b"/>
+          <a:lstStyle>
+            <a:lvl1pPr algn="r">
+              <a:defRPr sz="1200"/>
+            </a:lvl1pPr>
+          </a:lstStyle>
+          <a:p>
+            <a:fld id="{E1126DD3-35D5-7246-91BE-1EE079D03564}" type="slidenum">
+              <a:rPr lang="en-US" smtClean="0"/>
+              <a:t>‹#›</a:t>
+            </a:fld>
+            <a:endParaRPr lang="en-US"/>
+          </a:p>
+        </p:txBody>
+      </p:sp>
+    </p:spTree>
+    <p:extLst>
+      <p:ext uri="{BB962C8B-B14F-4D97-AF65-F5344CB8AC3E}">
+        <p14:creationId xmlns:p14="http://schemas.microsoft.com/office/powerpoint/2010/main" val="1724557770"/>
+      </p:ext>
+    </p:extLst>
+  </p:cSld>
+  <p:clrMap bg1="lt1" tx1="dk1" bg2="lt2" tx2="dk2" accent1="accent1" accent2="accent2" accent3="accent3" accent4="accent4" accent5="accent5" accent6="accent6" hlink="hlink" folHlink="folHlink"/>
+  <p:notesStyle>
+    <a:lvl1pPr marL="0" algn="l" defTabSz="914400" rtl="0" eaLnBrk="1" latinLnBrk="0" hangingPunct="1">
+      <a:defRPr sz="1200" kern="1200">
+        <a:solidFill>
+          <a:schemeClr val="tx1"/>
+        </a:solidFill>
+        <a:latin typeface="+mn-lt"/>
+        <a:ea typeface="+mn-ea"/>
+        <a:cs typeface="+mn-cs"/>
+      </a:defRPr>
+    </a:lvl1pPr>
+    <a:lvl2pPr marL="457200" algn="l" defTabSz="914400" rtl="0" eaLnBrk="1" latinLnBrk="0" hangingPunct="1">
+      <a:defRPr sz="1200" kern="1200">
+        <a:solidFill>
+          <a:schemeClr val="tx1"/>
+        </a:solidFill>
+        <a:latin typeface="+mn-lt"/>
+        <a:ea typeface="+mn-ea"/>
+        <a:cs typeface="+mn-cs"/>
+      </a:defRPr>
+    </a:lvl2pPr>
+    <a:lvl3pPr marL="914400" algn="l" defTabSz="914400" rtl="0" eaLnBrk="1" latinLnBrk="0" hangingPunct="1">
+      <a:defRPr sz="1200" kern="1200">
+        <a:solidFill>
+          <a:schemeClr val="tx1"/>
+        </a:solidFill>
+        <a:latin typeface="+mn-lt"/>
+        <a:ea typeface="+mn-ea"/>
+        <a:cs typeface="+mn-cs"/>
+      </a:defRPr>
+    </a:lvl3pPr>
+    <a:lvl4pPr marL="1371600" algn="l" defTabSz="914400" rtl="0" eaLnBrk="1" latinLnBrk="0" hangingPunct="1">
+      <a:defRPr sz="1200" kern="1200">
+        <a:solidFill>
+          <a:schemeClr val="tx1"/>
+        </a:solidFill>
+        <a:latin typeface="+mn-lt"/>
+        <a:ea typeface="+mn-ea"/>
+        <a:cs typeface="+mn-cs"/>
+      </a:defRPr>
+    </a:lvl4pPr>
+    <a:lvl5pPr marL="1828800" algn="l" defTabSz="914400" rtl="0" eaLnBrk="1" latinLnBrk="0" hangingPunct="1">
+      <a:defRPr sz="1200" kern="1200">
+        <a:solidFill>
+          <a:schemeClr val="tx1"/>
+        </a:solidFill>
+        <a:latin typeface="+mn-lt"/>
+        <a:ea typeface="+mn-ea"/>
+        <a:cs typeface="+mn-cs"/>
+      </a:defRPr>
+    </a:lvl5pPr>
+    <a:lvl6pPr marL="2286000" algn="l" defTabSz="914400" rtl="0" eaLnBrk="1" latinLnBrk="0" hangingPunct="1">
+      <a:defRPr sz="1200" kern="1200">
+        <a:solidFill>
+          <a:schemeClr val="tx1"/>
+        </a:solidFill>
+        <a:latin typeface="+mn-lt"/>
+        <a:ea typeface="+mn-ea"/>
+        <a:cs typeface="+mn-cs"/>
+      </a:defRPr>
+    </a:lvl6pPr>
+    <a:lvl7pPr marL="2743200" algn="l" defTabSz="914400" rtl="0" eaLnBrk="1" latinLnBrk="0" hangingPunct="1">
+      <a:defRPr sz="1200" kern="1200">
+        <a:solidFill>
+          <a:schemeClr val="tx1"/>
+        </a:solidFill>
+        <a:latin typeface="+mn-lt"/>
+        <a:ea typeface="+mn-ea"/>
+        <a:cs typeface="+mn-cs"/>
+      </a:defRPr>
+    </a:lvl7pPr>
+    <a:lvl8pPr marL="3200400" algn="l" defTabSz="914400" rtl="0" eaLnBrk="1" latinLnBrk="0" hangingPunct="1">
+      <a:defRPr sz="1200" kern="1200">
+        <a:solidFill>
+          <a:schemeClr val="tx1"/>
+        </a:solidFill>
+        <a:latin typeface="+mn-lt"/>
+        <a:ea typeface="+mn-ea"/>
+        <a:cs typeface="+mn-cs"/>
+      </a:defRPr>
+    </a:lvl8pPr>
+    <a:lvl9pPr marL="3657600" algn="l" defTabSz="914400" rtl="0" eaLnBrk="1" latinLnBrk="0" hangingPunct="1">
+      <a:defRPr sz="1200" kern="1200">
+        <a:solidFill>
+          <a:schemeClr val="tx1"/>
+        </a:solidFill>
+        <a:latin typeface="+mn-lt"/>
+        <a:ea typeface="+mn-ea"/>
+        <a:cs typeface="+mn-cs"/>
+      </a:defRPr>
+    </a:lvl9pPr>
+  </p:notesStyle>
+</p:notesMaster>
+</file>
+
+<file path=ppt/notesSlides/notesSlide1.xml><?xml version="1.0" encoding="utf-8"?>
+<p:notes xmlns:a="http://schemas.openxmlformats.org/drawingml/2006/main" xmlns:r="http://schemas.openxmlformats.org/officeDocument/2006/relationships" xmlns:p="http://schemas.openxmlformats.org/presentationml/2006/main">
+  <p:cSld>
+    <p:spTree>
+      <p:nvGrpSpPr>
+        <p:cNvPr id="1" name=""/>
+        <p:cNvGrpSpPr/>
+        <p:nvPr/>
+      </p:nvGrpSpPr>
+      <p:grpSpPr>
+        <a:xfrm>
+          <a:off x="0" y="0"/>
+          <a:ext cx="0" cy="0"/>
+          <a:chOff x="0" y="0"/>
+          <a:chExt cx="0" cy="0"/>
+        </a:xfrm>
+      </p:grpSpPr>
+      <p:sp>
+        <p:nvSpPr>
+          <p:cNvPr id="2" name="Slide Image Placeholder 1"/>
+          <p:cNvSpPr>
+            <a:spLocks noGrp="1" noRot="1" noChangeAspect="1"/>
+          </p:cNvSpPr>
+          <p:nvPr>
+            <p:ph type="sldImg"/>
+          </p:nvPr>
+        </p:nvSpPr>
+        <p:spPr/>
+      </p:sp>
+      <p:sp>
+        <p:nvSpPr>
+          <p:cNvPr id="3" name="Notes Placeholder 2"/>
+          <p:cNvSpPr>
+            <a:spLocks noGrp="1"/>
+          </p:cNvSpPr>
+          <p:nvPr>
+            <p:ph type="body" idx="1"/>
+          </p:nvPr>
+        </p:nvSpPr>
+        <p:spPr/>
+        <p:txBody>
+          <a:bodyPr/>
+          <a:lstStyle/>
+          <a:p>
+            <a:endParaRPr lang="en-US" dirty="0"/>
+          </a:p>
+        </p:txBody>
+      </p:sp>
+      <p:sp>
+        <p:nvSpPr>
+          <p:cNvPr id="4" name="Slide Number Placeholder 3"/>
+          <p:cNvSpPr>
+            <a:spLocks noGrp="1"/>
+          </p:cNvSpPr>
+          <p:nvPr>
+            <p:ph type="sldNum" sz="quarter" idx="10"/>
+          </p:nvPr>
+        </p:nvSpPr>
+        <p:spPr/>
+        <p:txBody>
+          <a:bodyPr/>
+          <a:lstStyle/>
+          <a:p>
+            <a:fld id="{E1126DD3-35D5-7246-91BE-1EE079D03564}" type="slidenum">
+              <a:rPr lang="en-US" smtClean="0"/>
+              <a:t>1</a:t>
+            </a:fld>
+            <a:endParaRPr lang="en-US"/>
+          </a:p>
+        </p:txBody>
+      </p:sp>
+    </p:spTree>
+    <p:extLst>
+      <p:ext uri="{BB962C8B-B14F-4D97-AF65-F5344CB8AC3E}">
+        <p14:creationId xmlns:p14="http://schemas.microsoft.com/office/powerpoint/2010/main" val="55656831"/>
+      </p:ext>
+    </p:extLst>
+  </p:cSld>
+  <p:clrMapOvr>
+    <a:masterClrMapping/>
+  </p:clrMapOvr>
+</p:notes>
+</file>
+
 <file path=ppt/slideLayouts/slideLayout1.xml><?xml version="1.0" encoding="utf-8"?>
 <p:sldLayout xmlns:a="http://schemas.openxmlformats.org/drawingml/2006/main" xmlns:r="http://schemas.openxmlformats.org/officeDocument/2006/relationships" xmlns:p="http://schemas.openxmlformats.org/presentationml/2006/main" type="title" preserve="1">
   <p:cSld name="Title Slide">
@@ -304,7 +741,7 @@
           <a:p>
             <a:fld id="{779256A2-DE0C-7447-B687-786F38514E8C}" type="datetimeFigureOut">
               <a:rPr lang="en-US" smtClean="0"/>
-              <a:t>7/11/24</a:t>
+              <a:t>7/25/24</a:t>
             </a:fld>
             <a:endParaRPr lang="en-US"/>
           </a:p>
@@ -474,7 +911,7 @@
           <a:p>
             <a:fld id="{779256A2-DE0C-7447-B687-786F38514E8C}" type="datetimeFigureOut">
               <a:rPr lang="en-US" smtClean="0"/>
-              <a:t>7/11/24</a:t>
+              <a:t>7/25/24</a:t>
             </a:fld>
             <a:endParaRPr lang="en-US"/>
           </a:p>
@@ -654,7 +1091,7 @@
           <a:p>
             <a:fld id="{779256A2-DE0C-7447-B687-786F38514E8C}" type="datetimeFigureOut">
               <a:rPr lang="en-US" smtClean="0"/>
-              <a:t>7/11/24</a:t>
+              <a:t>7/25/24</a:t>
             </a:fld>
             <a:endParaRPr lang="en-US"/>
           </a:p>
@@ -824,7 +1261,7 @@
           <a:p>
             <a:fld id="{779256A2-DE0C-7447-B687-786F38514E8C}" type="datetimeFigureOut">
               <a:rPr lang="en-US" smtClean="0"/>
-              <a:t>7/11/24</a:t>
+              <a:t>7/25/24</a:t>
             </a:fld>
             <a:endParaRPr lang="en-US"/>
           </a:p>
@@ -1070,7 +1507,7 @@
           <a:p>
             <a:fld id="{779256A2-DE0C-7447-B687-786F38514E8C}" type="datetimeFigureOut">
               <a:rPr lang="en-US" smtClean="0"/>
-              <a:t>7/11/24</a:t>
+              <a:t>7/25/24</a:t>
             </a:fld>
             <a:endParaRPr lang="en-US"/>
           </a:p>
@@ -1358,7 +1795,7 @@
           <a:p>
             <a:fld id="{779256A2-DE0C-7447-B687-786F38514E8C}" type="datetimeFigureOut">
               <a:rPr lang="en-US" smtClean="0"/>
-              <a:t>7/11/24</a:t>
+              <a:t>7/25/24</a:t>
             </a:fld>
             <a:endParaRPr lang="en-US"/>
           </a:p>
@@ -1780,7 +2217,7 @@
           <a:p>
             <a:fld id="{779256A2-DE0C-7447-B687-786F38514E8C}" type="datetimeFigureOut">
               <a:rPr lang="en-US" smtClean="0"/>
-              <a:t>7/11/24</a:t>
+              <a:t>7/25/24</a:t>
             </a:fld>
             <a:endParaRPr lang="en-US"/>
           </a:p>
@@ -1898,7 +2335,7 @@
           <a:p>
             <a:fld id="{779256A2-DE0C-7447-B687-786F38514E8C}" type="datetimeFigureOut">
               <a:rPr lang="en-US" smtClean="0"/>
-              <a:t>7/11/24</a:t>
+              <a:t>7/25/24</a:t>
             </a:fld>
             <a:endParaRPr lang="en-US"/>
           </a:p>
@@ -1993,7 +2430,7 @@
           <a:p>
             <a:fld id="{779256A2-DE0C-7447-B687-786F38514E8C}" type="datetimeFigureOut">
               <a:rPr lang="en-US" smtClean="0"/>
-              <a:t>7/11/24</a:t>
+              <a:t>7/25/24</a:t>
             </a:fld>
             <a:endParaRPr lang="en-US"/>
           </a:p>
@@ -2270,7 +2707,7 @@
           <a:p>
             <a:fld id="{779256A2-DE0C-7447-B687-786F38514E8C}" type="datetimeFigureOut">
               <a:rPr lang="en-US" smtClean="0"/>
-              <a:t>7/11/24</a:t>
+              <a:t>7/25/24</a:t>
             </a:fld>
             <a:endParaRPr lang="en-US"/>
           </a:p>
@@ -2523,7 +2960,7 @@
           <a:p>
             <a:fld id="{779256A2-DE0C-7447-B687-786F38514E8C}" type="datetimeFigureOut">
               <a:rPr lang="en-US" smtClean="0"/>
-              <a:t>7/11/24</a:t>
+              <a:t>7/25/24</a:t>
             </a:fld>
             <a:endParaRPr lang="en-US"/>
           </a:p>
@@ -2736,7 +3173,7 @@
           <a:p>
             <a:fld id="{779256A2-DE0C-7447-B687-786F38514E8C}" type="datetimeFigureOut">
               <a:rPr lang="en-US" smtClean="0"/>
-              <a:t>7/11/24</a:t>
+              <a:t>7/25/24</a:t>
             </a:fld>
             <a:endParaRPr lang="en-US"/>
           </a:p>
@@ -3119,8 +3556,8 @@
         </p:nvGrpSpPr>
         <p:grpSpPr>
           <a:xfrm>
-            <a:off x="269607" y="2447220"/>
-            <a:ext cx="902160" cy="902209"/>
+            <a:off x="45182" y="2517581"/>
+            <a:ext cx="759093" cy="751862"/>
             <a:chOff x="1370309" y="1881677"/>
             <a:chExt cx="902160" cy="902209"/>
           </a:xfrm>
@@ -3178,8 +3615,8 @@
           </p:nvSpPr>
           <p:spPr>
             <a:xfrm>
-              <a:off x="1446726" y="2101948"/>
-              <a:ext cx="762949" cy="461665"/>
+              <a:off x="1376153" y="2071764"/>
+              <a:ext cx="762948" cy="461665"/>
             </a:xfrm>
             <a:prstGeom prst="rect">
               <a:avLst/>
@@ -3211,10 +3648,10 @@
         </p:nvGrpSpPr>
         <p:grpSpPr>
           <a:xfrm>
-            <a:off x="8179707" y="3039626"/>
-            <a:ext cx="842390" cy="842436"/>
-            <a:chOff x="1776705" y="1864889"/>
-            <a:chExt cx="842390" cy="842436"/>
+            <a:off x="8365435" y="3076744"/>
+            <a:ext cx="714412" cy="704867"/>
+            <a:chOff x="1765252" y="1864889"/>
+            <a:chExt cx="853843" cy="842436"/>
           </a:xfrm>
         </p:grpSpPr>
         <p:sp>
@@ -3270,8 +3707,8 @@
           </p:nvSpPr>
           <p:spPr>
             <a:xfrm>
-              <a:off x="1816482" y="2023609"/>
-              <a:ext cx="762949" cy="461665"/>
+              <a:off x="1765252" y="1972379"/>
+              <a:ext cx="762950" cy="461666"/>
             </a:xfrm>
             <a:prstGeom prst="rect">
               <a:avLst/>
@@ -3303,10 +3740,10 @@
         </p:nvGrpSpPr>
         <p:grpSpPr>
           <a:xfrm>
-            <a:off x="4145382" y="2844230"/>
-            <a:ext cx="1391750" cy="1246370"/>
-            <a:chOff x="3531847" y="1721177"/>
-            <a:chExt cx="1498816" cy="1246370"/>
+            <a:off x="3674545" y="2968178"/>
+            <a:ext cx="2051404" cy="943081"/>
+            <a:chOff x="2872877" y="3379608"/>
+            <a:chExt cx="1483694" cy="1373566"/>
           </a:xfrm>
         </p:grpSpPr>
         <p:sp>
@@ -3317,7 +3754,7 @@
           </p:nvSpPr>
           <p:spPr>
             <a:xfrm>
-              <a:off x="3531847" y="1721177"/>
+              <a:off x="2872877" y="3379608"/>
               <a:ext cx="1483694" cy="1246370"/>
             </a:xfrm>
             <a:prstGeom prst="rect">
@@ -3365,8 +3802,8 @@
           </p:nvSpPr>
           <p:spPr>
             <a:xfrm>
-              <a:off x="3614891" y="1883816"/>
-              <a:ext cx="1415772" cy="830997"/>
+              <a:off x="3010258" y="3499585"/>
+              <a:ext cx="1306258" cy="1253589"/>
             </a:xfrm>
             <a:prstGeom prst="rect">
               <a:avLst/>
@@ -3381,22 +3818,36 @@
             <a:p>
               <a:pPr algn="ctr"/>
               <a:r>
-                <a:rPr lang="en-US" sz="2400" dirty="0" smtClean="0">
+                <a:rPr lang="en-US" sz="2000" dirty="0" smtClean="0">
                   <a:latin typeface="Times New Roman"/>
                   <a:cs typeface="Times New Roman"/>
                 </a:rPr>
-                <a:t>Bridge </a:t>
+                <a:t>Bridge Chloride</a:t>
               </a:r>
             </a:p>
             <a:p>
               <a:pPr algn="ctr"/>
               <a:r>
-                <a:rPr lang="en-US" sz="2400" dirty="0" smtClean="0">
+                <a:rPr lang="en-US" sz="2000" dirty="0" smtClean="0">
                   <a:latin typeface="Times New Roman"/>
                   <a:cs typeface="Times New Roman"/>
                 </a:rPr>
-                <a:t>Corrosion</a:t>
+                <a:t>Exposure Predictor</a:t>
               </a:r>
+              <a:r>
+                <a:rPr lang="en-US" sz="2000" dirty="0" smtClean="0">
+                  <a:latin typeface="Times New Roman"/>
+                  <a:cs typeface="Times New Roman"/>
+                </a:rPr>
+                <a:t> </a:t>
+              </a:r>
+              <a:endParaRPr lang="en-US" sz="2000" dirty="0" smtClean="0">
+                <a:latin typeface="Times New Roman"/>
+                <a:cs typeface="Times New Roman"/>
+              </a:endParaRPr>
+            </a:p>
+            <a:p>
+              <a:pPr algn="ctr"/>
               <a:endParaRPr lang="en-US" sz="2400" dirty="0">
                 <a:latin typeface="Times New Roman"/>
                 <a:cs typeface="Times New Roman"/>
@@ -3415,8 +3866,8 @@
         </p:nvCxnSpPr>
         <p:spPr>
           <a:xfrm>
-            <a:off x="1171767" y="2898325"/>
-            <a:ext cx="3011063" cy="397024"/>
+            <a:off x="804275" y="2893512"/>
+            <a:ext cx="2892822" cy="375931"/>
           </a:xfrm>
           <a:prstGeom prst="straightConnector1">
             <a:avLst/>
@@ -3452,7 +3903,7 @@
         </p:nvCxnSpPr>
         <p:spPr>
           <a:xfrm>
-            <a:off x="5538460" y="3460844"/>
+            <a:off x="5756046" y="3460786"/>
             <a:ext cx="2604597" cy="6571"/>
           </a:xfrm>
           <a:prstGeom prst="straightConnector1">
@@ -3489,7 +3940,7 @@
         </p:nvSpPr>
         <p:spPr>
           <a:xfrm>
-            <a:off x="809939" y="2275016"/>
+            <a:off x="321663" y="2226096"/>
             <a:ext cx="3380274" cy="923330"/>
           </a:xfrm>
           <a:prstGeom prst="rect">
@@ -3509,14 +3960,7 @@
                 <a:latin typeface="Times New Roman"/>
                 <a:cs typeface="Times New Roman"/>
               </a:rPr>
-              <a:t>User Inputs: </a:t>
-            </a:r>
-            <a:r>
-              <a:rPr lang="en-US" dirty="0" smtClean="0">
-                <a:latin typeface="Times New Roman"/>
-                <a:cs typeface="Times New Roman"/>
-              </a:rPr>
-              <a:t>Salt application rate</a:t>
+              <a:t>User Inputs: Salt application rate</a:t>
             </a:r>
           </a:p>
           <a:p>
@@ -3560,7 +4004,7 @@
         </p:nvSpPr>
         <p:spPr>
           <a:xfrm>
-            <a:off x="5468286" y="3098083"/>
+            <a:off x="5638700" y="3106011"/>
             <a:ext cx="2778808" cy="646331"/>
           </a:xfrm>
           <a:prstGeom prst="rect">
@@ -3614,7 +4058,7 @@
         </p:nvSpPr>
         <p:spPr>
           <a:xfrm>
-            <a:off x="1771896" y="4040046"/>
+            <a:off x="1530638" y="4067426"/>
             <a:ext cx="2450598" cy="923330"/>
           </a:xfrm>
           <a:prstGeom prst="rect">
@@ -3674,7 +4118,7 @@
         </p:nvSpPr>
         <p:spPr>
           <a:xfrm>
-            <a:off x="231676" y="3660011"/>
+            <a:off x="64033" y="3669383"/>
             <a:ext cx="1540220" cy="842436"/>
           </a:xfrm>
           <a:prstGeom prst="ellipse">
@@ -3719,7 +4163,7 @@
         </p:nvSpPr>
         <p:spPr>
           <a:xfrm>
-            <a:off x="269853" y="3809390"/>
+            <a:off x="111766" y="3836594"/>
             <a:ext cx="1465466" cy="461665"/>
           </a:xfrm>
           <a:prstGeom prst="rect">
@@ -3750,13 +4194,15 @@
       <p:cxnSp>
         <p:nvCxnSpPr>
           <p:cNvPr id="24" name="Straight Arrow Connector 23"/>
-          <p:cNvCxnSpPr/>
+          <p:cNvCxnSpPr>
+            <a:stCxn id="21" idx="6"/>
+          </p:cNvCxnSpPr>
           <p:nvPr/>
         </p:nvCxnSpPr>
         <p:spPr>
           <a:xfrm flipV="1">
-            <a:off x="1771896" y="3772827"/>
-            <a:ext cx="2373486" cy="317773"/>
+            <a:off x="1604253" y="3645374"/>
+            <a:ext cx="2092844" cy="445227"/>
           </a:xfrm>
           <a:prstGeom prst="straightConnector1">
             <a:avLst/>
@@ -4115,4 +4561,265 @@
   </a:objectDefaults>
   <a:extraClrSchemeLst/>
 </a:theme>
+</file>
+
+<file path=ppt/theme/theme2.xml><?xml version="1.0" encoding="utf-8"?>
+<a:theme xmlns:a="http://schemas.openxmlformats.org/drawingml/2006/main" name="Office Theme">
+  <a:themeElements>
+    <a:clrScheme name="Office">
+      <a:dk1>
+        <a:sysClr val="windowText" lastClr="000000"/>
+      </a:dk1>
+      <a:lt1>
+        <a:sysClr val="window" lastClr="FFFFFF"/>
+      </a:lt1>
+      <a:dk2>
+        <a:srgbClr val="44546A"/>
+      </a:dk2>
+      <a:lt2>
+        <a:srgbClr val="E7E6E6"/>
+      </a:lt2>
+      <a:accent1>
+        <a:srgbClr val="4472C4"/>
+      </a:accent1>
+      <a:accent2>
+        <a:srgbClr val="ED7D31"/>
+      </a:accent2>
+      <a:accent3>
+        <a:srgbClr val="A5A5A5"/>
+      </a:accent3>
+      <a:accent4>
+        <a:srgbClr val="FFC000"/>
+      </a:accent4>
+      <a:accent5>
+        <a:srgbClr val="5B9BD5"/>
+      </a:accent5>
+      <a:accent6>
+        <a:srgbClr val="70AD47"/>
+      </a:accent6>
+      <a:hlink>
+        <a:srgbClr val="0563C1"/>
+      </a:hlink>
+      <a:folHlink>
+        <a:srgbClr val="954F72"/>
+      </a:folHlink>
+    </a:clrScheme>
+    <a:fontScheme name="Office">
+      <a:majorFont>
+        <a:latin typeface="Calibri Light" panose="020F0302020204030204"/>
+        <a:ea typeface=""/>
+        <a:cs typeface=""/>
+        <a:font script="Jpan" typeface="Yu Gothic Light"/>
+        <a:font script="Hang" typeface="맑은 고딕"/>
+        <a:font script="Hans" typeface="DengXian Light"/>
+        <a:font script="Hant" typeface="新細明體"/>
+        <a:font script="Arab" typeface="Times New Roman"/>
+        <a:font script="Hebr" typeface="Times New Roman"/>
+        <a:font script="Thai" typeface="Angsana New"/>
+        <a:font script="Ethi" typeface="Nyala"/>
+        <a:font script="Beng" typeface="Vrinda"/>
+        <a:font script="Gujr" typeface="Shruti"/>
+        <a:font script="Khmr" typeface="MoolBoran"/>
+        <a:font script="Knda" typeface="Tunga"/>
+        <a:font script="Guru" typeface="Raavi"/>
+        <a:font script="Cans" typeface="Euphemia"/>
+        <a:font script="Cher" typeface="Plantagenet Cherokee"/>
+        <a:font script="Yiii" typeface="Microsoft Yi Baiti"/>
+        <a:font script="Tibt" typeface="Microsoft Himalaya"/>
+        <a:font script="Thaa" typeface="MV Boli"/>
+        <a:font script="Deva" typeface="Mangal"/>
+        <a:font script="Telu" typeface="Gautami"/>
+        <a:font script="Taml" typeface="Latha"/>
+        <a:font script="Syrc" typeface="Estrangelo Edessa"/>
+        <a:font script="Orya" typeface="Kalinga"/>
+        <a:font script="Mlym" typeface="Kartika"/>
+        <a:font script="Laoo" typeface="DokChampa"/>
+        <a:font script="Sinh" typeface="Iskoola Pota"/>
+        <a:font script="Mong" typeface="Mongolian Baiti"/>
+        <a:font script="Viet" typeface="Times New Roman"/>
+        <a:font script="Uigh" typeface="Microsoft Uighur"/>
+        <a:font script="Geor" typeface="Sylfaen"/>
+      </a:majorFont>
+      <a:minorFont>
+        <a:latin typeface="Calibri" panose="020F0502020204030204"/>
+        <a:ea typeface=""/>
+        <a:cs typeface=""/>
+        <a:font script="Jpan" typeface="Yu Gothic"/>
+        <a:font script="Hang" typeface="맑은 고딕"/>
+        <a:font script="Hans" typeface="DengXian"/>
+        <a:font script="Hant" typeface="新細明體"/>
+        <a:font script="Arab" typeface="Arial"/>
+        <a:font script="Hebr" typeface="Arial"/>
+        <a:font script="Thai" typeface="Cordia New"/>
+        <a:font script="Ethi" typeface="Nyala"/>
+        <a:font script="Beng" typeface="Vrinda"/>
+        <a:font script="Gujr" typeface="Shruti"/>
+        <a:font script="Khmr" typeface="DaunPenh"/>
+        <a:font script="Knda" typeface="Tunga"/>
+        <a:font script="Guru" typeface="Raavi"/>
+        <a:font script="Cans" typeface="Euphemia"/>
+        <a:font script="Cher" typeface="Plantagenet Cherokee"/>
+        <a:font script="Yiii" typeface="Microsoft Yi Baiti"/>
+        <a:font script="Tibt" typeface="Microsoft Himalaya"/>
+        <a:font script="Thaa" typeface="MV Boli"/>
+        <a:font script="Deva" typeface="Mangal"/>
+        <a:font script="Telu" typeface="Gautami"/>
+        <a:font script="Taml" typeface="Latha"/>
+        <a:font script="Syrc" typeface="Estrangelo Edessa"/>
+        <a:font script="Orya" typeface="Kalinga"/>
+        <a:font script="Mlym" typeface="Kartika"/>
+        <a:font script="Laoo" typeface="DokChampa"/>
+        <a:font script="Sinh" typeface="Iskoola Pota"/>
+        <a:font script="Mong" typeface="Mongolian Baiti"/>
+        <a:font script="Viet" typeface="Arial"/>
+        <a:font script="Uigh" typeface="Microsoft Uighur"/>
+        <a:font script="Geor" typeface="Sylfaen"/>
+      </a:minorFont>
+    </a:fontScheme>
+    <a:fmtScheme name="Office">
+      <a:fillStyleLst>
+        <a:solidFill>
+          <a:schemeClr val="phClr"/>
+        </a:solidFill>
+        <a:gradFill rotWithShape="1">
+          <a:gsLst>
+            <a:gs pos="0">
+              <a:schemeClr val="phClr">
+                <a:lumMod val="110000"/>
+                <a:satMod val="105000"/>
+                <a:tint val="67000"/>
+              </a:schemeClr>
+            </a:gs>
+            <a:gs pos="50000">
+              <a:schemeClr val="phClr">
+                <a:lumMod val="105000"/>
+                <a:satMod val="103000"/>
+                <a:tint val="73000"/>
+              </a:schemeClr>
+            </a:gs>
+            <a:gs pos="100000">
+              <a:schemeClr val="phClr">
+                <a:lumMod val="105000"/>
+                <a:satMod val="109000"/>
+                <a:tint val="81000"/>
+              </a:schemeClr>
+            </a:gs>
+          </a:gsLst>
+          <a:lin ang="5400000" scaled="0"/>
+        </a:gradFill>
+        <a:gradFill rotWithShape="1">
+          <a:gsLst>
+            <a:gs pos="0">
+              <a:schemeClr val="phClr">
+                <a:satMod val="103000"/>
+                <a:lumMod val="102000"/>
+                <a:tint val="94000"/>
+              </a:schemeClr>
+            </a:gs>
+            <a:gs pos="50000">
+              <a:schemeClr val="phClr">
+                <a:satMod val="110000"/>
+                <a:lumMod val="100000"/>
+                <a:shade val="100000"/>
+              </a:schemeClr>
+            </a:gs>
+            <a:gs pos="100000">
+              <a:schemeClr val="phClr">
+                <a:lumMod val="99000"/>
+                <a:satMod val="120000"/>
+                <a:shade val="78000"/>
+              </a:schemeClr>
+            </a:gs>
+          </a:gsLst>
+          <a:lin ang="5400000" scaled="0"/>
+        </a:gradFill>
+      </a:fillStyleLst>
+      <a:lnStyleLst>
+        <a:ln w="6350" cap="flat" cmpd="sng" algn="ctr">
+          <a:solidFill>
+            <a:schemeClr val="phClr"/>
+          </a:solidFill>
+          <a:prstDash val="solid"/>
+          <a:miter lim="800000"/>
+        </a:ln>
+        <a:ln w="12700" cap="flat" cmpd="sng" algn="ctr">
+          <a:solidFill>
+            <a:schemeClr val="phClr"/>
+          </a:solidFill>
+          <a:prstDash val="solid"/>
+          <a:miter lim="800000"/>
+        </a:ln>
+        <a:ln w="19050" cap="flat" cmpd="sng" algn="ctr">
+          <a:solidFill>
+            <a:schemeClr val="phClr"/>
+          </a:solidFill>
+          <a:prstDash val="solid"/>
+          <a:miter lim="800000"/>
+        </a:ln>
+      </a:lnStyleLst>
+      <a:effectStyleLst>
+        <a:effectStyle>
+          <a:effectLst/>
+        </a:effectStyle>
+        <a:effectStyle>
+          <a:effectLst/>
+        </a:effectStyle>
+        <a:effectStyle>
+          <a:effectLst>
+            <a:outerShdw blurRad="57150" dist="19050" dir="5400000" algn="ctr" rotWithShape="0">
+              <a:srgbClr val="000000">
+                <a:alpha val="63000"/>
+              </a:srgbClr>
+            </a:outerShdw>
+          </a:effectLst>
+        </a:effectStyle>
+      </a:effectStyleLst>
+      <a:bgFillStyleLst>
+        <a:solidFill>
+          <a:schemeClr val="phClr"/>
+        </a:solidFill>
+        <a:solidFill>
+          <a:schemeClr val="phClr">
+            <a:tint val="95000"/>
+            <a:satMod val="170000"/>
+          </a:schemeClr>
+        </a:solidFill>
+        <a:gradFill rotWithShape="1">
+          <a:gsLst>
+            <a:gs pos="0">
+              <a:schemeClr val="phClr">
+                <a:tint val="93000"/>
+                <a:satMod val="150000"/>
+                <a:shade val="98000"/>
+                <a:lumMod val="102000"/>
+              </a:schemeClr>
+            </a:gs>
+            <a:gs pos="50000">
+              <a:schemeClr val="phClr">
+                <a:tint val="98000"/>
+                <a:satMod val="130000"/>
+                <a:shade val="90000"/>
+                <a:lumMod val="103000"/>
+              </a:schemeClr>
+            </a:gs>
+            <a:gs pos="100000">
+              <a:schemeClr val="phClr">
+                <a:shade val="63000"/>
+                <a:satMod val="120000"/>
+              </a:schemeClr>
+            </a:gs>
+          </a:gsLst>
+          <a:lin ang="5400000" scaled="0"/>
+        </a:gradFill>
+      </a:bgFillStyleLst>
+    </a:fmtScheme>
+  </a:themeElements>
+  <a:objectDefaults/>
+  <a:extraClrSchemeLst/>
+  <a:extLst>
+    <a:ext uri="{05A4C25C-085E-4340-85A3-A5531E510DB2}">
+      <thm15:themeFamily xmlns:thm15="http://schemas.microsoft.com/office/thememl/2012/main" name="Office Theme" id="{62F939B6-93AF-4DB8-9C6B-D6C7DFDC589F}" vid="{4A3C46E8-61CC-4603-A589-7422A47A8E4A}"/>
+    </a:ext>
+  </a:extLst>
+</a:theme>
 </file>
</xml_diff>